<commit_message>
HTML - WEEK 1 DAY 2 & 3.pptx
</commit_message>
<xml_diff>
--- a/Presentations/HTML - WEEK 1 DAY 2 & 3.pptx
+++ b/Presentations/HTML - WEEK 1 DAY 2 & 3.pptx
@@ -220,7 +220,7 @@
             <a:fld id="{1D8BD707-D9CF-40AE-B4C6-C98DA3205C09}" type="datetimeFigureOut">
               <a:rPr lang="en-US" smtClean="0"/>
               <a:pPr/>
-              <a:t>02-May-23</a:t>
+              <a:t>08-Jun-23</a:t>
             </a:fld>
             <a:endParaRPr lang="en-US"/>
           </a:p>
@@ -448,7 +448,7 @@
             <a:fld id="{1D8BD707-D9CF-40AE-B4C6-C98DA3205C09}" type="datetimeFigureOut">
               <a:rPr lang="en-US" smtClean="0"/>
               <a:pPr/>
-              <a:t>02-May-23</a:t>
+              <a:t>08-Jun-23</a:t>
             </a:fld>
             <a:endParaRPr lang="en-US"/>
           </a:p>
@@ -625,7 +625,7 @@
             <a:fld id="{1D8BD707-D9CF-40AE-B4C6-C98DA3205C09}" type="datetimeFigureOut">
               <a:rPr lang="en-US" smtClean="0"/>
               <a:pPr/>
-              <a:t>02-May-23</a:t>
+              <a:t>08-Jun-23</a:t>
             </a:fld>
             <a:endParaRPr lang="en-US"/>
           </a:p>
@@ -792,7 +792,7 @@
             <a:fld id="{1D8BD707-D9CF-40AE-B4C6-C98DA3205C09}" type="datetimeFigureOut">
               <a:rPr lang="en-US" smtClean="0"/>
               <a:pPr/>
-              <a:t>02-May-23</a:t>
+              <a:t>08-Jun-23</a:t>
             </a:fld>
             <a:endParaRPr lang="en-US"/>
           </a:p>
@@ -1038,7 +1038,7 @@
             <a:fld id="{1D8BD707-D9CF-40AE-B4C6-C98DA3205C09}" type="datetimeFigureOut">
               <a:rPr lang="en-US" smtClean="0"/>
               <a:pPr/>
-              <a:t>02-May-23</a:t>
+              <a:t>08-Jun-23</a:t>
             </a:fld>
             <a:endParaRPr lang="en-US"/>
           </a:p>
@@ -1304,7 +1304,7 @@
             <a:fld id="{1D8BD707-D9CF-40AE-B4C6-C98DA3205C09}" type="datetimeFigureOut">
               <a:rPr lang="en-US" smtClean="0"/>
               <a:pPr/>
-              <a:t>02-May-23</a:t>
+              <a:t>08-Jun-23</a:t>
             </a:fld>
             <a:endParaRPr lang="en-US"/>
           </a:p>
@@ -1680,7 +1680,7 @@
             <a:fld id="{1D8BD707-D9CF-40AE-B4C6-C98DA3205C09}" type="datetimeFigureOut">
               <a:rPr lang="en-US" smtClean="0"/>
               <a:pPr/>
-              <a:t>02-May-23</a:t>
+              <a:t>08-Jun-23</a:t>
             </a:fld>
             <a:endParaRPr lang="en-US"/>
           </a:p>
@@ -1795,7 +1795,7 @@
             <a:fld id="{1D8BD707-D9CF-40AE-B4C6-C98DA3205C09}" type="datetimeFigureOut">
               <a:rPr lang="en-US" smtClean="0"/>
               <a:pPr/>
-              <a:t>02-May-23</a:t>
+              <a:t>08-Jun-23</a:t>
             </a:fld>
             <a:endParaRPr lang="en-US"/>
           </a:p>
@@ -1887,7 +1887,7 @@
             <a:fld id="{1D8BD707-D9CF-40AE-B4C6-C98DA3205C09}" type="datetimeFigureOut">
               <a:rPr lang="en-US" smtClean="0"/>
               <a:pPr/>
-              <a:t>02-May-23</a:t>
+              <a:t>08-Jun-23</a:t>
             </a:fld>
             <a:endParaRPr lang="en-US"/>
           </a:p>
@@ -2147,7 +2147,7 @@
             <a:fld id="{1D8BD707-D9CF-40AE-B4C6-C98DA3205C09}" type="datetimeFigureOut">
               <a:rPr lang="en-US" smtClean="0"/>
               <a:pPr/>
-              <a:t>02-May-23</a:t>
+              <a:t>08-Jun-23</a:t>
             </a:fld>
             <a:endParaRPr lang="en-US"/>
           </a:p>
@@ -2413,7 +2413,7 @@
             <a:fld id="{1D8BD707-D9CF-40AE-B4C6-C98DA3205C09}" type="datetimeFigureOut">
               <a:rPr lang="en-US" smtClean="0"/>
               <a:pPr/>
-              <a:t>02-May-23</a:t>
+              <a:t>08-Jun-23</a:t>
             </a:fld>
             <a:endParaRPr lang="en-US"/>
           </a:p>
@@ -2632,7 +2632,7 @@
             <a:fld id="{1D8BD707-D9CF-40AE-B4C6-C98DA3205C09}" type="datetimeFigureOut">
               <a:rPr lang="en-US" smtClean="0"/>
               <a:pPr/>
-              <a:t>02-May-23</a:t>
+              <a:t>08-Jun-23</a:t>
             </a:fld>
             <a:endParaRPr lang="en-US"/>
           </a:p>
@@ -3183,7 +3183,7 @@
         <p:spPr>
           <a:xfrm>
             <a:off x="375557" y="1981200"/>
-            <a:ext cx="8320314" cy="3416320"/>
+            <a:ext cx="8320314" cy="2308324"/>
           </a:xfrm>
           <a:prstGeom prst="rect">
             <a:avLst/>
@@ -3203,10 +3203,8 @@
                 </a:solidFill>
                 <a:latin typeface="Gill Sans MT"/>
               </a:rPr>
-              <a:t>Questions on Previous Class</a:t>
-            </a:r>
-          </a:p>
-          <a:p>
+              <a:t>Questions on Previous </a:t>
+            </a:r>
             <a:r>
               <a:rPr lang="en-US" sz="2400" b="1" dirty="0" smtClean="0">
                 <a:solidFill>
@@ -3214,29 +3212,7 @@
                 </a:solidFill>
                 <a:latin typeface="Gill Sans MT"/>
               </a:rPr>
-              <a:t>General Rules</a:t>
-            </a:r>
-          </a:p>
-          <a:p>
-            <a:r>
-              <a:rPr lang="en-US" sz="2400" b="1" dirty="0" smtClean="0">
-                <a:solidFill>
-                  <a:srgbClr val="002060"/>
-                </a:solidFill>
-                <a:latin typeface="Gill Sans MT"/>
-              </a:rPr>
-              <a:t>Document structure in HTML</a:t>
-            </a:r>
-          </a:p>
-          <a:p>
-            <a:r>
-              <a:rPr lang="en-US" sz="2400" b="1" dirty="0" smtClean="0">
-                <a:solidFill>
-                  <a:srgbClr val="002060"/>
-                </a:solidFill>
-                <a:latin typeface="Gill Sans MT"/>
-              </a:rPr>
-              <a:t>Text formatting</a:t>
+              <a:t>Class</a:t>
             </a:r>
           </a:p>
           <a:p>
@@ -3251,7 +3227,7 @@
                 </a:solidFill>
                 <a:latin typeface="Gill Sans MT"/>
               </a:rPr>
-              <a:t>Preserve format</a:t>
+              <a:t>Text formatting</a:t>
             </a:r>
           </a:p>
           <a:p>
@@ -3266,7 +3242,16 @@
                 </a:solidFill>
                 <a:latin typeface="Gill Sans MT"/>
               </a:rPr>
-              <a:t>Italics &amp; emphasis</a:t>
+              <a:t>Italics </a:t>
+            </a:r>
+            <a:r>
+              <a:rPr lang="en-US" sz="2400" b="1" dirty="0" smtClean="0">
+                <a:solidFill>
+                  <a:srgbClr val="002060"/>
+                </a:solidFill>
+                <a:latin typeface="Gill Sans MT"/>
+              </a:rPr>
+              <a:t>&amp; emphasis</a:t>
             </a:r>
           </a:p>
           <a:p>

</xml_diff>